<commit_message>
Updates to Figure Images, C.score filtering version
</commit_message>
<xml_diff>
--- a/Images/Figures_PPT/ChlorophytaHeatPlot.pptx
+++ b/Images/Figures_PPT/ChlorophytaHeatPlot.pptx
@@ -11666,7 +11666,7 @@
             </a:custGeom>
             <a:ln w="10840" cap="flat">
               <a:solidFill>
-                <a:srgbClr val="2DA183">
+                <a:srgbClr val="B0803D">
                   <a:alpha val="100000"/>
                 </a:srgbClr>
               </a:solidFill>
@@ -11706,7 +11706,7 @@
             </a:custGeom>
             <a:ln w="10840" cap="flat">
               <a:solidFill>
-                <a:srgbClr val="452566">
+                <a:srgbClr val="C84259">
                   <a:alpha val="100000"/>
                 </a:srgbClr>
               </a:solidFill>
@@ -11746,7 +11746,7 @@
             </a:custGeom>
             <a:ln w="10840" cap="flat">
               <a:solidFill>
-                <a:srgbClr val="452566">
+                <a:srgbClr val="C74359">
                   <a:alpha val="100000"/>
                 </a:srgbClr>
               </a:solidFill>
@@ -11786,7 +11786,7 @@
             </a:custGeom>
             <a:ln w="10840" cap="flat">
               <a:solidFill>
-                <a:srgbClr val="44326F">
+                <a:srgbClr val="BE4E6B">
                   <a:alpha val="100000"/>
                 </a:srgbClr>
               </a:solidFill>
@@ -11826,7 +11826,7 @@
             </a:custGeom>
             <a:ln w="10840" cap="flat">
               <a:solidFill>
-                <a:srgbClr val="45175D">
+                <a:srgbClr val="D03448">
                   <a:alpha val="100000"/>
                 </a:srgbClr>
               </a:solidFill>
@@ -11866,7 +11866,7 @@
             </a:custGeom>
             <a:ln w="10840" cap="flat">
               <a:solidFill>
-                <a:srgbClr val="39568C">
+                <a:srgbClr val="976BA2">
                   <a:alpha val="100000"/>
                 </a:srgbClr>
               </a:solidFill>
@@ -11906,7 +11906,7 @@
             </a:custGeom>
             <a:ln w="10840" cap="flat">
               <a:solidFill>
-                <a:srgbClr val="35678D">
+                <a:srgbClr val="4E80D3">
                   <a:alpha val="100000"/>
                 </a:srgbClr>
               </a:solidFill>
@@ -11946,7 +11946,7 @@
             </a:custGeom>
             <a:ln w="10840" cap="flat">
               <a:solidFill>
-                <a:srgbClr val="443672">
+                <a:srgbClr val="BB5270">
                   <a:alpha val="100000"/>
                 </a:srgbClr>
               </a:solidFill>
@@ -11986,7 +11986,7 @@
             </a:custGeom>
             <a:ln w="10840" cap="flat">
               <a:solidFill>
-                <a:srgbClr val="450D59">
+                <a:srgbClr val="D32A3F">
                   <a:alpha val="100000"/>
                 </a:srgbClr>
               </a:solidFill>
@@ -12026,7 +12026,7 @@
             </a:custGeom>
             <a:ln w="10840" cap="flat">
               <a:solidFill>
-                <a:srgbClr val="440857">
+                <a:srgbClr val="D5253B">
                   <a:alpha val="100000"/>
                 </a:srgbClr>
               </a:solidFill>
@@ -12066,7 +12066,7 @@
             </a:custGeom>
             <a:ln w="10840" cap="flat">
               <a:solidFill>
-                <a:srgbClr val="45115B">
+                <a:srgbClr val="D22E43">
                   <a:alpha val="100000"/>
                 </a:srgbClr>
               </a:solidFill>
@@ -12106,7 +12106,7 @@
             </a:custGeom>
             <a:ln w="10840" cap="flat">
               <a:solidFill>
-                <a:srgbClr val="45105A">
+                <a:srgbClr val="D22D42">
                   <a:alpha val="100000"/>
                 </a:srgbClr>
               </a:solidFill>
@@ -12146,7 +12146,7 @@
             </a:custGeom>
             <a:ln w="10840" cap="flat">
               <a:solidFill>
-                <a:srgbClr val="440957">
+                <a:srgbClr val="D5263C">
                   <a:alpha val="100000"/>
                 </a:srgbClr>
               </a:solidFill>
@@ -12186,7 +12186,7 @@
             </a:custGeom>
             <a:ln w="10840" cap="flat">
               <a:solidFill>
-                <a:srgbClr val="433D78">
+                <a:srgbClr val="B4587B">
                   <a:alpha val="100000"/>
                 </a:srgbClr>
               </a:solidFill>
@@ -12226,7 +12226,7 @@
             </a:custGeom>
             <a:ln w="10840" cap="flat">
               <a:solidFill>
-                <a:srgbClr val="443471">
+                <a:srgbClr val="BD506E">
                   <a:alpha val="100000"/>
                 </a:srgbClr>
               </a:solidFill>
@@ -12266,7 +12266,7 @@
             </a:custGeom>
             <a:ln w="10840" cap="flat">
               <a:solidFill>
-                <a:srgbClr val="452B6A">
+                <a:srgbClr val="C44861">
                   <a:alpha val="100000"/>
                 </a:srgbClr>
               </a:solidFill>
@@ -12306,7 +12306,7 @@
             </a:custGeom>
             <a:ln w="10840" cap="flat">
               <a:solidFill>
-                <a:srgbClr val="451F62">
+                <a:srgbClr val="CC3C51">
                   <a:alpha val="100000"/>
                 </a:srgbClr>
               </a:solidFill>
@@ -12346,7 +12346,7 @@
             </a:custGeom>
             <a:ln w="10840" cap="flat">
               <a:solidFill>
-                <a:srgbClr val="45175D">
+                <a:srgbClr val="D03448">
                   <a:alpha val="100000"/>
                 </a:srgbClr>
               </a:solidFill>
@@ -12386,7 +12386,7 @@
             </a:custGeom>
             <a:ln w="10840" cap="flat">
               <a:solidFill>
-                <a:srgbClr val="37628D">
+                <a:srgbClr val="6A7AC5">
                   <a:alpha val="100000"/>
                 </a:srgbClr>
               </a:solidFill>
@@ -12426,7 +12426,7 @@
             </a:custGeom>
             <a:ln w="10840" cap="flat">
               <a:solidFill>
-                <a:srgbClr val="443370">
+                <a:srgbClr val="BE4F6C">
                   <a:alpha val="100000"/>
                 </a:srgbClr>
               </a:solidFill>
@@ -12466,7 +12466,7 @@
             </a:custGeom>
             <a:ln w="10840" cap="flat">
               <a:solidFill>
-                <a:srgbClr val="29AF7F">
+                <a:srgbClr val="B88100">
                   <a:alpha val="100000"/>
                 </a:srgbClr>
               </a:solidFill>
@@ -12506,7 +12506,7 @@
             </a:custGeom>
             <a:ln w="10840" cap="flat">
               <a:solidFill>
-                <a:srgbClr val="41427C">
+                <a:srgbClr val="AF5D83">
                   <a:alpha val="100000"/>
                 </a:srgbClr>
               </a:solidFill>
@@ -12546,7 +12546,7 @@
             </a:custGeom>
             <a:ln w="10840" cap="flat">
               <a:solidFill>
-                <a:srgbClr val="451E61">
+                <a:srgbClr val="CC3B50">
                   <a:alpha val="100000"/>
                 </a:srgbClr>
               </a:solidFill>
@@ -12586,7 +12586,7 @@
             </a:custGeom>
             <a:ln w="10840" cap="flat">
               <a:solidFill>
-                <a:srgbClr val="440556">
+                <a:srgbClr val="D62239">
                   <a:alpha val="100000"/>
                 </a:srgbClr>
               </a:solidFill>
@@ -12626,7 +12626,7 @@
             </a:custGeom>
             <a:ln w="10840" cap="flat">
               <a:solidFill>
-                <a:srgbClr val="440957">
+                <a:srgbClr val="D5263C">
                   <a:alpha val="100000"/>
                 </a:srgbClr>
               </a:solidFill>
@@ -12666,7 +12666,7 @@
             </a:custGeom>
             <a:ln w="10840" cap="flat">
               <a:solidFill>
-                <a:srgbClr val="45115B">
+                <a:srgbClr val="D22E43">
                   <a:alpha val="100000"/>
                 </a:srgbClr>
               </a:solidFill>
@@ -12706,7 +12706,7 @@
             </a:custGeom>
             <a:ln w="10840" cap="flat">
               <a:solidFill>
-                <a:srgbClr val="45165D">
+                <a:srgbClr val="D03348">
                   <a:alpha val="100000"/>
                 </a:srgbClr>
               </a:solidFill>
@@ -12746,7 +12746,7 @@
             </a:custGeom>
             <a:ln w="10840" cap="flat">
               <a:solidFill>
-                <a:srgbClr val="452063">
+                <a:srgbClr val="CA3E53">
                   <a:alpha val="100000"/>
                 </a:srgbClr>
               </a:solidFill>
@@ -12786,7 +12786,7 @@
             </a:custGeom>
             <a:ln w="10840" cap="flat">
               <a:solidFill>
-                <a:srgbClr val="451F62">
+                <a:srgbClr val="CC3C51">
                   <a:alpha val="100000"/>
                 </a:srgbClr>
               </a:solidFill>
@@ -12826,7 +12826,7 @@
             </a:custGeom>
             <a:ln w="10840" cap="flat">
               <a:solidFill>
-                <a:srgbClr val="451A5F">
+                <a:srgbClr val="CE384C">
                   <a:alpha val="100000"/>
                 </a:srgbClr>
               </a:solidFill>
@@ -12866,7 +12866,7 @@
             </a:custGeom>
             <a:ln w="10840" cap="flat">
               <a:solidFill>
-                <a:srgbClr val="451F62">
+                <a:srgbClr val="CC3C51">
                   <a:alpha val="100000"/>
                 </a:srgbClr>
               </a:solidFill>
@@ -12906,7 +12906,7 @@
             </a:custGeom>
             <a:ln w="10840" cap="flat">
               <a:solidFill>
-                <a:srgbClr val="45115B">
+                <a:srgbClr val="D22E43">
                   <a:alpha val="100000"/>
                 </a:srgbClr>
               </a:solidFill>
@@ -12946,7 +12946,7 @@
             </a:custGeom>
             <a:ln w="10840" cap="flat">
               <a:solidFill>
-                <a:srgbClr val="443773">
+                <a:srgbClr val="BA5372">
                   <a:alpha val="100000"/>
                 </a:srgbClr>
               </a:solidFill>
@@ -12986,7 +12986,7 @@
             </a:custGeom>
             <a:ln w="10840" cap="flat">
               <a:solidFill>
-                <a:srgbClr val="452164">
+                <a:srgbClr val="CA3F55">
                   <a:alpha val="100000"/>
                 </a:srgbClr>
               </a:solidFill>
@@ -13026,7 +13026,7 @@
             </a:custGeom>
             <a:ln w="10840" cap="flat">
               <a:solidFill>
-                <a:srgbClr val="45105A">
+                <a:srgbClr val="D22D42">
                   <a:alpha val="100000"/>
                 </a:srgbClr>
               </a:solidFill>
@@ -13066,7 +13066,7 @@
             </a:custGeom>
             <a:ln w="10840" cap="flat">
               <a:solidFill>
-                <a:srgbClr val="452667">
+                <a:srgbClr val="C7435A">
                   <a:alpha val="100000"/>
                 </a:srgbClr>
               </a:solidFill>
@@ -13106,7 +13106,7 @@
             </a:custGeom>
             <a:ln w="10840" cap="flat">
               <a:solidFill>
-                <a:srgbClr val="45125B">
+                <a:srgbClr val="D12F44">
                   <a:alpha val="100000"/>
                 </a:srgbClr>
               </a:solidFill>
@@ -13146,7 +13146,7 @@
             </a:custGeom>
             <a:ln w="10840" cap="flat">
               <a:solidFill>
-                <a:srgbClr val="45306E">
+                <a:srgbClr val="C04C68">
                   <a:alpha val="100000"/>
                 </a:srgbClr>
               </a:solidFill>
@@ -13186,7 +13186,7 @@
             </a:custGeom>
             <a:ln w="10840" cap="flat">
               <a:solidFill>
-                <a:srgbClr val="336B8D">
+                <a:srgbClr val="3C83D8">
                   <a:alpha val="100000"/>
                 </a:srgbClr>
               </a:solidFill>
@@ -13226,7 +13226,7 @@
             </a:custGeom>
             <a:ln w="10840" cap="flat">
               <a:solidFill>
-                <a:srgbClr val="3A538A">
+                <a:srgbClr val="9A6A9E">
                   <a:alpha val="100000"/>
                 </a:srgbClr>
               </a:solidFill>
@@ -13266,7 +13266,7 @@
             </a:custGeom>
             <a:ln w="10840" cap="flat">
               <a:solidFill>
-                <a:srgbClr val="45175E">
+                <a:srgbClr val="CF3549">
                   <a:alpha val="100000"/>
                 </a:srgbClr>
               </a:solidFill>
@@ -13306,7 +13306,7 @@
             </a:custGeom>
             <a:ln w="10840" cap="flat">
               <a:solidFill>
-                <a:srgbClr val="3D4D85">
+                <a:srgbClr val="A26594">
                   <a:alpha val="100000"/>
                 </a:srgbClr>
               </a:solidFill>
@@ -13346,7 +13346,7 @@
             </a:custGeom>
             <a:ln w="10840" cap="flat">
               <a:solidFill>
-                <a:srgbClr val="452E6D">
+                <a:srgbClr val="C14B66">
                   <a:alpha val="100000"/>
                 </a:srgbClr>
               </a:solidFill>
@@ -13386,7 +13386,7 @@
             </a:custGeom>
             <a:ln w="10840" cap="flat">
               <a:solidFill>
-                <a:srgbClr val="45185E">
+                <a:srgbClr val="CF3549">
                   <a:alpha val="100000"/>
                 </a:srgbClr>
               </a:solidFill>
@@ -13426,7 +13426,7 @@
             </a:custGeom>
             <a:ln w="10840" cap="flat">
               <a:solidFill>
-                <a:srgbClr val="45165D">
+                <a:srgbClr val="D03348">
                   <a:alpha val="100000"/>
                 </a:srgbClr>
               </a:solidFill>
@@ -13466,7 +13466,7 @@
             </a:custGeom>
             <a:ln w="10840" cap="flat">
               <a:solidFill>
-                <a:srgbClr val="452969">
+                <a:srgbClr val="C5465E">
                   <a:alpha val="100000"/>
                 </a:srgbClr>
               </a:solidFill>
@@ -13506,7 +13506,7 @@
             </a:custGeom>
             <a:ln w="10840" cap="flat">
               <a:solidFill>
-                <a:srgbClr val="45135B">
+                <a:srgbClr val="D13045">
                   <a:alpha val="100000"/>
                 </a:srgbClr>
               </a:solidFill>
@@ -13546,7 +13546,7 @@
             </a:custGeom>
             <a:ln w="10840" cap="flat">
               <a:solidFill>
-                <a:srgbClr val="452264">
+                <a:srgbClr val="CA3F55">
                   <a:alpha val="100000"/>
                 </a:srgbClr>
               </a:solidFill>
@@ -13586,7 +13586,7 @@
             </a:custGeom>
             <a:ln w="10840" cap="flat">
               <a:solidFill>
-                <a:srgbClr val="440455">
+                <a:srgbClr val="D62138">
                   <a:alpha val="100000"/>
                 </a:srgbClr>
               </a:solidFill>
@@ -13626,7 +13626,7 @@
             </a:custGeom>
             <a:ln w="10840" cap="flat">
               <a:solidFill>
-                <a:srgbClr val="452667">
+                <a:srgbClr val="C7435A">
                   <a:alpha val="100000"/>
                 </a:srgbClr>
               </a:solidFill>
@@ -13666,7 +13666,7 @@
             </a:custGeom>
             <a:ln w="10840" cap="flat">
               <a:solidFill>
-                <a:srgbClr val="45145C">
+                <a:srgbClr val="D13145">
                   <a:alpha val="100000"/>
                 </a:srgbClr>
               </a:solidFill>
@@ -13706,7 +13706,7 @@
             </a:custGeom>
             <a:ln w="10840" cap="flat">
               <a:solidFill>
-                <a:srgbClr val="39598C">
+                <a:srgbClr val="8E6FAA">
                   <a:alpha val="100000"/>
                 </a:srgbClr>
               </a:solidFill>
@@ -13746,7 +13746,7 @@
             </a:custGeom>
             <a:ln w="10840" cap="flat">
               <a:solidFill>
-                <a:srgbClr val="45125B">
+                <a:srgbClr val="D22F43">
                   <a:alpha val="100000"/>
                 </a:srgbClr>
               </a:solidFill>
@@ -13786,7 +13786,7 @@
             </a:custGeom>
             <a:ln w="10840" cap="flat">
               <a:solidFill>
-                <a:srgbClr val="440455">
+                <a:srgbClr val="D62139">
                   <a:alpha val="100000"/>
                 </a:srgbClr>
               </a:solidFill>
@@ -13826,7 +13826,7 @@
             </a:custGeom>
             <a:ln w="10840" cap="flat">
               <a:solidFill>
-                <a:srgbClr val="451F62">
+                <a:srgbClr val="CB3C51">
                   <a:alpha val="100000"/>
                 </a:srgbClr>
               </a:solidFill>
@@ -13866,7 +13866,7 @@
             </a:custGeom>
             <a:ln w="10840" cap="flat">
               <a:solidFill>
-                <a:srgbClr val="440656">
+                <a:srgbClr val="D5233A">
                   <a:alpha val="100000"/>
                 </a:srgbClr>
               </a:solidFill>
@@ -13906,7 +13906,7 @@
             </a:custGeom>
             <a:ln w="10840" cap="flat">
               <a:solidFill>
-                <a:srgbClr val="440756">
+                <a:srgbClr val="D5243B">
                   <a:alpha val="100000"/>
                 </a:srgbClr>
               </a:solidFill>
@@ -13946,7 +13946,7 @@
             </a:custGeom>
             <a:ln w="10840" cap="flat">
               <a:solidFill>
-                <a:srgbClr val="45125B">
+                <a:srgbClr val="D22F43">
                   <a:alpha val="100000"/>
                 </a:srgbClr>
               </a:solidFill>
@@ -13986,7 +13986,7 @@
             </a:custGeom>
             <a:ln w="10840" cap="flat">
               <a:solidFill>
-                <a:srgbClr val="452B6A">
+                <a:srgbClr val="C44861">
                   <a:alpha val="100000"/>
                 </a:srgbClr>
               </a:solidFill>
@@ -14026,7 +14026,7 @@
             </a:custGeom>
             <a:ln w="10840" cap="flat">
               <a:solidFill>
-                <a:srgbClr val="452969">
+                <a:srgbClr val="C5465E">
                   <a:alpha val="100000"/>
                 </a:srgbClr>
               </a:solidFill>
@@ -14066,7 +14066,7 @@
             </a:custGeom>
             <a:ln w="10840" cap="flat">
               <a:solidFill>
-                <a:srgbClr val="451F62">
+                <a:srgbClr val="CB3C51">
                   <a:alpha val="100000"/>
                 </a:srgbClr>
               </a:solidFill>
@@ -14106,7 +14106,7 @@
             </a:custGeom>
             <a:ln w="10840" cap="flat">
               <a:solidFill>
-                <a:srgbClr val="31708D">
+                <a:srgbClr val="5F82C5">
                   <a:alpha val="100000"/>
                 </a:srgbClr>
               </a:solidFill>
@@ -14146,7 +14146,7 @@
             </a:custGeom>
             <a:ln w="10840" cap="flat">
               <a:solidFill>
-                <a:srgbClr val="423F79">
+                <a:srgbClr val="B3597D">
                   <a:alpha val="100000"/>
                 </a:srgbClr>
               </a:solidFill>
@@ -14186,7 +14186,7 @@
             </a:custGeom>
             <a:ln w="10840" cap="flat">
               <a:solidFill>
-                <a:srgbClr val="452264">
+                <a:srgbClr val="C93F55">
                   <a:alpha val="100000"/>
                 </a:srgbClr>
               </a:solidFill>
@@ -14226,7 +14226,7 @@
             </a:custGeom>
             <a:ln w="10840" cap="flat">
               <a:solidFill>
-                <a:srgbClr val="45105A">
+                <a:srgbClr val="D22D42">
                   <a:alpha val="100000"/>
                 </a:srgbClr>
               </a:solidFill>
@@ -14266,7 +14266,7 @@
             </a:custGeom>
             <a:ln w="10840" cap="flat">
               <a:solidFill>
-                <a:srgbClr val="45125B">
+                <a:srgbClr val="D22F43">
                   <a:alpha val="100000"/>
                 </a:srgbClr>
               </a:solidFill>
@@ -14306,7 +14306,7 @@
             </a:custGeom>
             <a:ln w="10840" cap="flat">
               <a:solidFill>
-                <a:srgbClr val="450D59">
+                <a:srgbClr val="D32A3F">
                   <a:alpha val="100000"/>
                 </a:srgbClr>
               </a:solidFill>
@@ -14346,7 +14346,7 @@
             </a:custGeom>
             <a:ln w="10840" cap="flat">
               <a:solidFill>
-                <a:srgbClr val="452465">
+                <a:srgbClr val="C84158">
                   <a:alpha val="100000"/>
                 </a:srgbClr>
               </a:solidFill>
@@ -14386,7 +14386,7 @@
             </a:custGeom>
             <a:ln w="10840" cap="flat">
               <a:solidFill>
-                <a:srgbClr val="452868">
+                <a:srgbClr val="C6455D">
                   <a:alpha val="100000"/>
                 </a:srgbClr>
               </a:solidFill>
@@ -14426,7 +14426,7 @@
             </a:custGeom>
             <a:ln w="10840" cap="flat">
               <a:solidFill>
-                <a:srgbClr val="452C6B">
+                <a:srgbClr val="C24A63">
                   <a:alpha val="100000"/>
                 </a:srgbClr>
               </a:solidFill>
@@ -14466,7 +14466,7 @@
             </a:custGeom>
             <a:ln w="10840" cap="flat">
               <a:solidFill>
-                <a:srgbClr val="45115A">
+                <a:srgbClr val="D22E43">
                   <a:alpha val="100000"/>
                 </a:srgbClr>
               </a:solidFill>
@@ -14506,7 +14506,7 @@
             </a:custGeom>
             <a:ln w="10840" cap="flat">
               <a:solidFill>
-                <a:srgbClr val="423F7A">
+                <a:srgbClr val="B25A7F">
                   <a:alpha val="100000"/>
                 </a:srgbClr>
               </a:solidFill>
@@ -14546,7 +14546,7 @@
             </a:custGeom>
             <a:ln w="10840" cap="flat">
               <a:solidFill>
-                <a:srgbClr val="452F6D">
+                <a:srgbClr val="C04C67">
                   <a:alpha val="100000"/>
                 </a:srgbClr>
               </a:solidFill>
@@ -14586,7 +14586,7 @@
             </a:custGeom>
             <a:ln w="10840" cap="flat">
               <a:solidFill>
-                <a:srgbClr val="452063">
+                <a:srgbClr val="CB3D53">
                   <a:alpha val="100000"/>
                 </a:srgbClr>
               </a:solidFill>
@@ -14626,7 +14626,7 @@
             </a:custGeom>
             <a:ln w="10840" cap="flat">
               <a:solidFill>
-                <a:srgbClr val="450B58">
+                <a:srgbClr val="D4283D">
                   <a:alpha val="100000"/>
                 </a:srgbClr>
               </a:solidFill>
@@ -14666,7 +14666,7 @@
             </a:custGeom>
             <a:ln w="10840" cap="flat">
               <a:solidFill>
-                <a:srgbClr val="42417B">
+                <a:srgbClr val="B15B81">
                   <a:alpha val="100000"/>
                 </a:srgbClr>
               </a:solidFill>
@@ -14706,7 +14706,7 @@
             </a:custGeom>
             <a:ln w="10840" cap="flat">
               <a:solidFill>
-                <a:srgbClr val="450F59">
+                <a:srgbClr val="D32C41">
                   <a:alpha val="100000"/>
                 </a:srgbClr>
               </a:solidFill>
@@ -14746,7 +14746,7 @@
             </a:custGeom>
             <a:ln w="10840" cap="flat">
               <a:solidFill>
-                <a:srgbClr val="45145C">
+                <a:srgbClr val="D13145">
                   <a:alpha val="100000"/>
                 </a:srgbClr>
               </a:solidFill>
@@ -14786,7 +14786,7 @@
             </a:custGeom>
             <a:ln w="10840" cap="flat">
               <a:solidFill>
-                <a:srgbClr val="440154">
+                <a:srgbClr val="D71D36">
                   <a:alpha val="100000"/>
                 </a:srgbClr>
               </a:solidFill>
@@ -14826,7 +14826,7 @@
             </a:custGeom>
             <a:ln w="10840" cap="flat">
               <a:solidFill>
-                <a:srgbClr val="41427C">
+                <a:srgbClr val="AF5C83">
                   <a:alpha val="100000"/>
                 </a:srgbClr>
               </a:solidFill>
@@ -14874,7 +14874,7 @@
               <a:r>
                 <a:rPr sz="569">
                   <a:solidFill>
-                    <a:srgbClr val="2DA183">
+                    <a:srgbClr val="B0803D">
                       <a:alpha val="100000"/>
                     </a:srgbClr>
                   </a:solidFill>
@@ -14920,7 +14920,7 @@
               <a:r>
                 <a:rPr sz="569">
                   <a:solidFill>
-                    <a:srgbClr val="452566">
+                    <a:srgbClr val="C84259">
                       <a:alpha val="100000"/>
                     </a:srgbClr>
                   </a:solidFill>
@@ -14966,7 +14966,7 @@
               <a:r>
                 <a:rPr sz="569">
                   <a:solidFill>
-                    <a:srgbClr val="452566">
+                    <a:srgbClr val="C74359">
                       <a:alpha val="100000"/>
                     </a:srgbClr>
                   </a:solidFill>
@@ -15012,7 +15012,7 @@
               <a:r>
                 <a:rPr sz="569">
                   <a:solidFill>
-                    <a:srgbClr val="44326F">
+                    <a:srgbClr val="BE4E6B">
                       <a:alpha val="100000"/>
                     </a:srgbClr>
                   </a:solidFill>
@@ -15058,7 +15058,7 @@
               <a:r>
                 <a:rPr sz="569">
                   <a:solidFill>
-                    <a:srgbClr val="45175D">
+                    <a:srgbClr val="D03448">
                       <a:alpha val="100000"/>
                     </a:srgbClr>
                   </a:solidFill>
@@ -15104,7 +15104,7 @@
               <a:r>
                 <a:rPr sz="569">
                   <a:solidFill>
-                    <a:srgbClr val="39568C">
+                    <a:srgbClr val="976BA2">
                       <a:alpha val="100000"/>
                     </a:srgbClr>
                   </a:solidFill>
@@ -15150,7 +15150,7 @@
               <a:r>
                 <a:rPr sz="569">
                   <a:solidFill>
-                    <a:srgbClr val="35678D">
+                    <a:srgbClr val="4E80D3">
                       <a:alpha val="100000"/>
                     </a:srgbClr>
                   </a:solidFill>
@@ -15196,7 +15196,7 @@
               <a:r>
                 <a:rPr sz="569">
                   <a:solidFill>
-                    <a:srgbClr val="443672">
+                    <a:srgbClr val="BB5270">
                       <a:alpha val="100000"/>
                     </a:srgbClr>
                   </a:solidFill>
@@ -15242,7 +15242,7 @@
               <a:r>
                 <a:rPr sz="569">
                   <a:solidFill>
-                    <a:srgbClr val="450D59">
+                    <a:srgbClr val="D32A3F">
                       <a:alpha val="100000"/>
                     </a:srgbClr>
                   </a:solidFill>
@@ -15288,7 +15288,7 @@
               <a:r>
                 <a:rPr sz="569">
                   <a:solidFill>
-                    <a:srgbClr val="440857">
+                    <a:srgbClr val="D5253B">
                       <a:alpha val="100000"/>
                     </a:srgbClr>
                   </a:solidFill>
@@ -15334,7 +15334,7 @@
               <a:r>
                 <a:rPr sz="569">
                   <a:solidFill>
-                    <a:srgbClr val="45115B">
+                    <a:srgbClr val="D22E43">
                       <a:alpha val="100000"/>
                     </a:srgbClr>
                   </a:solidFill>
@@ -15380,7 +15380,7 @@
               <a:r>
                 <a:rPr sz="569">
                   <a:solidFill>
-                    <a:srgbClr val="45105A">
+                    <a:srgbClr val="D22D42">
                       <a:alpha val="100000"/>
                     </a:srgbClr>
                   </a:solidFill>
@@ -15426,7 +15426,7 @@
               <a:r>
                 <a:rPr sz="569">
                   <a:solidFill>
-                    <a:srgbClr val="440957">
+                    <a:srgbClr val="D5263C">
                       <a:alpha val="100000"/>
                     </a:srgbClr>
                   </a:solidFill>
@@ -15472,7 +15472,7 @@
               <a:r>
                 <a:rPr sz="569">
                   <a:solidFill>
-                    <a:srgbClr val="433D78">
+                    <a:srgbClr val="B4587B">
                       <a:alpha val="100000"/>
                     </a:srgbClr>
                   </a:solidFill>
@@ -15518,7 +15518,7 @@
               <a:r>
                 <a:rPr sz="569">
                   <a:solidFill>
-                    <a:srgbClr val="443471">
+                    <a:srgbClr val="BD506E">
                       <a:alpha val="100000"/>
                     </a:srgbClr>
                   </a:solidFill>
@@ -15564,7 +15564,7 @@
               <a:r>
                 <a:rPr sz="569">
                   <a:solidFill>
-                    <a:srgbClr val="452B6A">
+                    <a:srgbClr val="C44861">
                       <a:alpha val="100000"/>
                     </a:srgbClr>
                   </a:solidFill>
@@ -15610,7 +15610,7 @@
               <a:r>
                 <a:rPr sz="569">
                   <a:solidFill>
-                    <a:srgbClr val="451F62">
+                    <a:srgbClr val="CC3C51">
                       <a:alpha val="100000"/>
                     </a:srgbClr>
                   </a:solidFill>
@@ -15656,7 +15656,7 @@
               <a:r>
                 <a:rPr sz="569">
                   <a:solidFill>
-                    <a:srgbClr val="45175D">
+                    <a:srgbClr val="D03448">
                       <a:alpha val="100000"/>
                     </a:srgbClr>
                   </a:solidFill>
@@ -15702,7 +15702,7 @@
               <a:r>
                 <a:rPr sz="569">
                   <a:solidFill>
-                    <a:srgbClr val="37628D">
+                    <a:srgbClr val="6A7AC5">
                       <a:alpha val="100000"/>
                     </a:srgbClr>
                   </a:solidFill>
@@ -15748,7 +15748,7 @@
               <a:r>
                 <a:rPr sz="569">
                   <a:solidFill>
-                    <a:srgbClr val="443370">
+                    <a:srgbClr val="BE4F6C">
                       <a:alpha val="100000"/>
                     </a:srgbClr>
                   </a:solidFill>
@@ -15794,7 +15794,7 @@
               <a:r>
                 <a:rPr sz="569">
                   <a:solidFill>
-                    <a:srgbClr val="29AF7F">
+                    <a:srgbClr val="B88100">
                       <a:alpha val="100000"/>
                     </a:srgbClr>
                   </a:solidFill>
@@ -15840,7 +15840,7 @@
               <a:r>
                 <a:rPr sz="569">
                   <a:solidFill>
-                    <a:srgbClr val="41427C">
+                    <a:srgbClr val="AF5D83">
                       <a:alpha val="100000"/>
                     </a:srgbClr>
                   </a:solidFill>
@@ -15886,7 +15886,7 @@
               <a:r>
                 <a:rPr sz="569">
                   <a:solidFill>
-                    <a:srgbClr val="451E61">
+                    <a:srgbClr val="CC3B50">
                       <a:alpha val="100000"/>
                     </a:srgbClr>
                   </a:solidFill>
@@ -15932,7 +15932,7 @@
               <a:r>
                 <a:rPr sz="569">
                   <a:solidFill>
-                    <a:srgbClr val="440556">
+                    <a:srgbClr val="D62239">
                       <a:alpha val="100000"/>
                     </a:srgbClr>
                   </a:solidFill>
@@ -15978,7 +15978,7 @@
               <a:r>
                 <a:rPr sz="569">
                   <a:solidFill>
-                    <a:srgbClr val="440957">
+                    <a:srgbClr val="D5263C">
                       <a:alpha val="100000"/>
                     </a:srgbClr>
                   </a:solidFill>
@@ -16024,7 +16024,7 @@
               <a:r>
                 <a:rPr sz="569">
                   <a:solidFill>
-                    <a:srgbClr val="45115B">
+                    <a:srgbClr val="D22E43">
                       <a:alpha val="100000"/>
                     </a:srgbClr>
                   </a:solidFill>
@@ -16070,7 +16070,7 @@
               <a:r>
                 <a:rPr sz="569">
                   <a:solidFill>
-                    <a:srgbClr val="45165D">
+                    <a:srgbClr val="D03348">
                       <a:alpha val="100000"/>
                     </a:srgbClr>
                   </a:solidFill>
@@ -16116,7 +16116,7 @@
               <a:r>
                 <a:rPr sz="569">
                   <a:solidFill>
-                    <a:srgbClr val="452063">
+                    <a:srgbClr val="CA3E53">
                       <a:alpha val="100000"/>
                     </a:srgbClr>
                   </a:solidFill>
@@ -16162,7 +16162,7 @@
               <a:r>
                 <a:rPr sz="569">
                   <a:solidFill>
-                    <a:srgbClr val="451F62">
+                    <a:srgbClr val="CC3C51">
                       <a:alpha val="100000"/>
                     </a:srgbClr>
                   </a:solidFill>
@@ -16208,7 +16208,7 @@
               <a:r>
                 <a:rPr sz="569">
                   <a:solidFill>
-                    <a:srgbClr val="451A5F">
+                    <a:srgbClr val="CE384C">
                       <a:alpha val="100000"/>
                     </a:srgbClr>
                   </a:solidFill>
@@ -16254,7 +16254,7 @@
               <a:r>
                 <a:rPr sz="569">
                   <a:solidFill>
-                    <a:srgbClr val="451F62">
+                    <a:srgbClr val="CC3C51">
                       <a:alpha val="100000"/>
                     </a:srgbClr>
                   </a:solidFill>
@@ -16300,7 +16300,7 @@
               <a:r>
                 <a:rPr sz="569">
                   <a:solidFill>
-                    <a:srgbClr val="45115B">
+                    <a:srgbClr val="D22E43">
                       <a:alpha val="100000"/>
                     </a:srgbClr>
                   </a:solidFill>
@@ -16346,7 +16346,7 @@
               <a:r>
                 <a:rPr sz="569">
                   <a:solidFill>
-                    <a:srgbClr val="443773">
+                    <a:srgbClr val="BA5372">
                       <a:alpha val="100000"/>
                     </a:srgbClr>
                   </a:solidFill>
@@ -16392,7 +16392,7 @@
               <a:r>
                 <a:rPr sz="569">
                   <a:solidFill>
-                    <a:srgbClr val="452164">
+                    <a:srgbClr val="CA3F55">
                       <a:alpha val="100000"/>
                     </a:srgbClr>
                   </a:solidFill>
@@ -16438,7 +16438,7 @@
               <a:r>
                 <a:rPr sz="569">
                   <a:solidFill>
-                    <a:srgbClr val="45105A">
+                    <a:srgbClr val="D22D42">
                       <a:alpha val="100000"/>
                     </a:srgbClr>
                   </a:solidFill>
@@ -16484,7 +16484,7 @@
               <a:r>
                 <a:rPr sz="569">
                   <a:solidFill>
-                    <a:srgbClr val="452667">
+                    <a:srgbClr val="C7435A">
                       <a:alpha val="100000"/>
                     </a:srgbClr>
                   </a:solidFill>
@@ -16530,7 +16530,7 @@
               <a:r>
                 <a:rPr sz="569">
                   <a:solidFill>
-                    <a:srgbClr val="45125B">
+                    <a:srgbClr val="D12F44">
                       <a:alpha val="100000"/>
                     </a:srgbClr>
                   </a:solidFill>
@@ -16576,7 +16576,7 @@
               <a:r>
                 <a:rPr sz="569">
                   <a:solidFill>
-                    <a:srgbClr val="45306E">
+                    <a:srgbClr val="C04C68">
                       <a:alpha val="100000"/>
                     </a:srgbClr>
                   </a:solidFill>
@@ -16622,7 +16622,7 @@
               <a:r>
                 <a:rPr sz="569">
                   <a:solidFill>
-                    <a:srgbClr val="336B8D">
+                    <a:srgbClr val="3C83D8">
                       <a:alpha val="100000"/>
                     </a:srgbClr>
                   </a:solidFill>
@@ -16668,7 +16668,7 @@
               <a:r>
                 <a:rPr sz="569">
                   <a:solidFill>
-                    <a:srgbClr val="3A538A">
+                    <a:srgbClr val="9A6A9E">
                       <a:alpha val="100000"/>
                     </a:srgbClr>
                   </a:solidFill>
@@ -16714,7 +16714,7 @@
               <a:r>
                 <a:rPr sz="569">
                   <a:solidFill>
-                    <a:srgbClr val="45175E">
+                    <a:srgbClr val="CF3549">
                       <a:alpha val="100000"/>
                     </a:srgbClr>
                   </a:solidFill>
@@ -16760,7 +16760,7 @@
               <a:r>
                 <a:rPr sz="569">
                   <a:solidFill>
-                    <a:srgbClr val="3D4D85">
+                    <a:srgbClr val="A26594">
                       <a:alpha val="100000"/>
                     </a:srgbClr>
                   </a:solidFill>
@@ -16806,7 +16806,7 @@
               <a:r>
                 <a:rPr sz="569">
                   <a:solidFill>
-                    <a:srgbClr val="452E6D">
+                    <a:srgbClr val="C14B66">
                       <a:alpha val="100000"/>
                     </a:srgbClr>
                   </a:solidFill>
@@ -16852,7 +16852,7 @@
               <a:r>
                 <a:rPr sz="569">
                   <a:solidFill>
-                    <a:srgbClr val="45185E">
+                    <a:srgbClr val="CF3549">
                       <a:alpha val="100000"/>
                     </a:srgbClr>
                   </a:solidFill>
@@ -16898,7 +16898,7 @@
               <a:r>
                 <a:rPr sz="569">
                   <a:solidFill>
-                    <a:srgbClr val="45165D">
+                    <a:srgbClr val="D03348">
                       <a:alpha val="100000"/>
                     </a:srgbClr>
                   </a:solidFill>
@@ -16944,7 +16944,7 @@
               <a:r>
                 <a:rPr sz="569">
                   <a:solidFill>
-                    <a:srgbClr val="452969">
+                    <a:srgbClr val="C5465E">
                       <a:alpha val="100000"/>
                     </a:srgbClr>
                   </a:solidFill>
@@ -16990,7 +16990,7 @@
               <a:r>
                 <a:rPr sz="569">
                   <a:solidFill>
-                    <a:srgbClr val="45135B">
+                    <a:srgbClr val="D13045">
                       <a:alpha val="100000"/>
                     </a:srgbClr>
                   </a:solidFill>
@@ -17036,7 +17036,7 @@
               <a:r>
                 <a:rPr sz="569">
                   <a:solidFill>
-                    <a:srgbClr val="452264">
+                    <a:srgbClr val="CA3F55">
                       <a:alpha val="100000"/>
                     </a:srgbClr>
                   </a:solidFill>
@@ -17082,7 +17082,7 @@
               <a:r>
                 <a:rPr sz="569">
                   <a:solidFill>
-                    <a:srgbClr val="440455">
+                    <a:srgbClr val="D62138">
                       <a:alpha val="100000"/>
                     </a:srgbClr>
                   </a:solidFill>
@@ -17128,7 +17128,7 @@
               <a:r>
                 <a:rPr sz="569">
                   <a:solidFill>
-                    <a:srgbClr val="452667">
+                    <a:srgbClr val="C7435A">
                       <a:alpha val="100000"/>
                     </a:srgbClr>
                   </a:solidFill>
@@ -17174,7 +17174,7 @@
               <a:r>
                 <a:rPr sz="569">
                   <a:solidFill>
-                    <a:srgbClr val="45145C">
+                    <a:srgbClr val="D13145">
                       <a:alpha val="100000"/>
                     </a:srgbClr>
                   </a:solidFill>
@@ -17220,7 +17220,7 @@
               <a:r>
                 <a:rPr sz="569">
                   <a:solidFill>
-                    <a:srgbClr val="39598C">
+                    <a:srgbClr val="8E6FAA">
                       <a:alpha val="100000"/>
                     </a:srgbClr>
                   </a:solidFill>
@@ -17266,7 +17266,7 @@
               <a:r>
                 <a:rPr sz="569">
                   <a:solidFill>
-                    <a:srgbClr val="45125B">
+                    <a:srgbClr val="D22F43">
                       <a:alpha val="100000"/>
                     </a:srgbClr>
                   </a:solidFill>
@@ -17312,7 +17312,7 @@
               <a:r>
                 <a:rPr sz="569">
                   <a:solidFill>
-                    <a:srgbClr val="440455">
+                    <a:srgbClr val="D62139">
                       <a:alpha val="100000"/>
                     </a:srgbClr>
                   </a:solidFill>
@@ -17358,7 +17358,7 @@
               <a:r>
                 <a:rPr sz="569">
                   <a:solidFill>
-                    <a:srgbClr val="451F62">
+                    <a:srgbClr val="CB3C51">
                       <a:alpha val="100000"/>
                     </a:srgbClr>
                   </a:solidFill>
@@ -17404,7 +17404,7 @@
               <a:r>
                 <a:rPr sz="569">
                   <a:solidFill>
-                    <a:srgbClr val="440656">
+                    <a:srgbClr val="D5233A">
                       <a:alpha val="100000"/>
                     </a:srgbClr>
                   </a:solidFill>
@@ -17450,7 +17450,7 @@
               <a:r>
                 <a:rPr sz="569">
                   <a:solidFill>
-                    <a:srgbClr val="440756">
+                    <a:srgbClr val="D5243B">
                       <a:alpha val="100000"/>
                     </a:srgbClr>
                   </a:solidFill>
@@ -17496,7 +17496,7 @@
               <a:r>
                 <a:rPr sz="569">
                   <a:solidFill>
-                    <a:srgbClr val="45125B">
+                    <a:srgbClr val="D22F43">
                       <a:alpha val="100000"/>
                     </a:srgbClr>
                   </a:solidFill>
@@ -17542,7 +17542,7 @@
               <a:r>
                 <a:rPr sz="569">
                   <a:solidFill>
-                    <a:srgbClr val="452B6A">
+                    <a:srgbClr val="C44861">
                       <a:alpha val="100000"/>
                     </a:srgbClr>
                   </a:solidFill>
@@ -17588,7 +17588,7 @@
               <a:r>
                 <a:rPr sz="569">
                   <a:solidFill>
-                    <a:srgbClr val="452969">
+                    <a:srgbClr val="C5465E">
                       <a:alpha val="100000"/>
                     </a:srgbClr>
                   </a:solidFill>
@@ -17634,7 +17634,7 @@
               <a:r>
                 <a:rPr sz="569">
                   <a:solidFill>
-                    <a:srgbClr val="451F62">
+                    <a:srgbClr val="CB3C51">
                       <a:alpha val="100000"/>
                     </a:srgbClr>
                   </a:solidFill>
@@ -17680,7 +17680,7 @@
               <a:r>
                 <a:rPr sz="569">
                   <a:solidFill>
-                    <a:srgbClr val="31708D">
+                    <a:srgbClr val="5F82C5">
                       <a:alpha val="100000"/>
                     </a:srgbClr>
                   </a:solidFill>
@@ -17726,7 +17726,7 @@
               <a:r>
                 <a:rPr sz="569">
                   <a:solidFill>
-                    <a:srgbClr val="423F79">
+                    <a:srgbClr val="B3597D">
                       <a:alpha val="100000"/>
                     </a:srgbClr>
                   </a:solidFill>
@@ -17772,7 +17772,7 @@
               <a:r>
                 <a:rPr sz="569">
                   <a:solidFill>
-                    <a:srgbClr val="452264">
+                    <a:srgbClr val="C93F55">
                       <a:alpha val="100000"/>
                     </a:srgbClr>
                   </a:solidFill>
@@ -17818,7 +17818,7 @@
               <a:r>
                 <a:rPr sz="569">
                   <a:solidFill>
-                    <a:srgbClr val="45105A">
+                    <a:srgbClr val="D22D42">
                       <a:alpha val="100000"/>
                     </a:srgbClr>
                   </a:solidFill>
@@ -17864,7 +17864,7 @@
               <a:r>
                 <a:rPr sz="569">
                   <a:solidFill>
-                    <a:srgbClr val="45125B">
+                    <a:srgbClr val="D22F43">
                       <a:alpha val="100000"/>
                     </a:srgbClr>
                   </a:solidFill>
@@ -17910,7 +17910,7 @@
               <a:r>
                 <a:rPr sz="569">
                   <a:solidFill>
-                    <a:srgbClr val="450D59">
+                    <a:srgbClr val="D32A3F">
                       <a:alpha val="100000"/>
                     </a:srgbClr>
                   </a:solidFill>
@@ -17956,7 +17956,7 @@
               <a:r>
                 <a:rPr sz="569">
                   <a:solidFill>
-                    <a:srgbClr val="452465">
+                    <a:srgbClr val="C84158">
                       <a:alpha val="100000"/>
                     </a:srgbClr>
                   </a:solidFill>
@@ -18002,7 +18002,7 @@
               <a:r>
                 <a:rPr sz="569">
                   <a:solidFill>
-                    <a:srgbClr val="452868">
+                    <a:srgbClr val="C6455D">
                       <a:alpha val="100000"/>
                     </a:srgbClr>
                   </a:solidFill>
@@ -18048,7 +18048,7 @@
               <a:r>
                 <a:rPr sz="569">
                   <a:solidFill>
-                    <a:srgbClr val="452C6B">
+                    <a:srgbClr val="C24A63">
                       <a:alpha val="100000"/>
                     </a:srgbClr>
                   </a:solidFill>
@@ -18094,7 +18094,7 @@
               <a:r>
                 <a:rPr sz="569">
                   <a:solidFill>
-                    <a:srgbClr val="45115A">
+                    <a:srgbClr val="D22E43">
                       <a:alpha val="100000"/>
                     </a:srgbClr>
                   </a:solidFill>
@@ -18140,7 +18140,7 @@
               <a:r>
                 <a:rPr sz="569">
                   <a:solidFill>
-                    <a:srgbClr val="423F7A">
+                    <a:srgbClr val="B25A7F">
                       <a:alpha val="100000"/>
                     </a:srgbClr>
                   </a:solidFill>
@@ -18186,7 +18186,7 @@
               <a:r>
                 <a:rPr sz="569">
                   <a:solidFill>
-                    <a:srgbClr val="452F6D">
+                    <a:srgbClr val="C04C67">
                       <a:alpha val="100000"/>
                     </a:srgbClr>
                   </a:solidFill>
@@ -18232,7 +18232,7 @@
               <a:r>
                 <a:rPr sz="569">
                   <a:solidFill>
-                    <a:srgbClr val="452063">
+                    <a:srgbClr val="CB3D53">
                       <a:alpha val="100000"/>
                     </a:srgbClr>
                   </a:solidFill>
@@ -18278,7 +18278,7 @@
               <a:r>
                 <a:rPr sz="569">
                   <a:solidFill>
-                    <a:srgbClr val="450B58">
+                    <a:srgbClr val="D4283D">
                       <a:alpha val="100000"/>
                     </a:srgbClr>
                   </a:solidFill>
@@ -18324,7 +18324,7 @@
               <a:r>
                 <a:rPr sz="569">
                   <a:solidFill>
-                    <a:srgbClr val="42417B">
+                    <a:srgbClr val="B15B81">
                       <a:alpha val="100000"/>
                     </a:srgbClr>
                   </a:solidFill>
@@ -18370,7 +18370,7 @@
               <a:r>
                 <a:rPr sz="569">
                   <a:solidFill>
-                    <a:srgbClr val="450F59">
+                    <a:srgbClr val="D32C41">
                       <a:alpha val="100000"/>
                     </a:srgbClr>
                   </a:solidFill>
@@ -18416,7 +18416,7 @@
               <a:r>
                 <a:rPr sz="569">
                   <a:solidFill>
-                    <a:srgbClr val="45145C">
+                    <a:srgbClr val="D13145">
                       <a:alpha val="100000"/>
                     </a:srgbClr>
                   </a:solidFill>
@@ -18462,7 +18462,7 @@
               <a:r>
                 <a:rPr sz="569">
                   <a:solidFill>
-                    <a:srgbClr val="440154">
+                    <a:srgbClr val="D71D36">
                       <a:alpha val="100000"/>
                     </a:srgbClr>
                   </a:solidFill>
@@ -18508,7 +18508,7 @@
               <a:r>
                 <a:rPr sz="569">
                   <a:solidFill>
-                    <a:srgbClr val="41427C">
+                    <a:srgbClr val="AF5C83">
                       <a:alpha val="100000"/>
                     </a:srgbClr>
                   </a:solidFill>

</xml_diff>